<commit_message>
FIX #17226 TIME 3:45 revert tinybutstrong version for locale date
</commit_message>
<xml_diff>
--- a/vendor/tinybutstrong/opentbs/demo/demo_ms_powerpoint.pptx
+++ b/vendor/tinybutstrong/opentbs/demo/demo_ms_powerpoint.pptx
@@ -219,13 +219,13 @@
                   <c:v>1.5</c:v>
                 </c:pt>
                 <c:pt idx="1">
-                  <c:v>1.5</c:v>
+                  <c:v>1.1000000000000001</c:v>
                 </c:pt>
                 <c:pt idx="2">
-                  <c:v>1.5</c:v>
+                  <c:v>0.5</c:v>
                 </c:pt>
                 <c:pt idx="3">
-                  <c:v>1.5</c:v>
+                  <c:v>0.2</c:v>
                 </c:pt>
               </c:numCache>
             </c:numRef>
@@ -273,13 +273,13 @@
                 <c:formatCode>General</c:formatCode>
                 <c:ptCount val="4"/>
                 <c:pt idx="0">
-                  <c:v>1.5</c:v>
+                  <c:v>0.3</c:v>
                 </c:pt>
                 <c:pt idx="1">
-                  <c:v>1.5</c:v>
+                  <c:v>0.7</c:v>
                 </c:pt>
                 <c:pt idx="2">
-                  <c:v>1.5</c:v>
+                  <c:v>1.2</c:v>
                 </c:pt>
                 <c:pt idx="3">
                   <c:v>1.5</c:v>
@@ -333,13 +333,13 @@
                   <c:v>1.5</c:v>
                 </c:pt>
                 <c:pt idx="1">
-                  <c:v>1.5</c:v>
+                  <c:v>1.7</c:v>
                 </c:pt>
                 <c:pt idx="2">
-                  <c:v>1.5</c:v>
+                  <c:v>1.6</c:v>
                 </c:pt>
                 <c:pt idx="3">
-                  <c:v>1.5</c:v>
+                  <c:v>1.3</c:v>
                 </c:pt>
               </c:numCache>
             </c:numRef>
@@ -355,12 +355,12 @@
         </c:dLbls>
         <c:gapWidth val="150"/>
         <c:shape val="cylinder"/>
-        <c:axId val="112102400"/>
-        <c:axId val="112104192"/>
+        <c:axId val="109867008"/>
+        <c:axId val="109868544"/>
         <c:axId val="0"/>
       </c:bar3DChart>
       <c:catAx>
-        <c:axId val="112102400"/>
+        <c:axId val="109867008"/>
         <c:scaling>
           <c:orientation val="minMax"/>
         </c:scaling>
@@ -379,7 +379,7 @@
             <a:endParaRPr lang="fr-FR"/>
           </a:p>
         </c:txPr>
-        <c:crossAx val="112104192"/>
+        <c:crossAx val="109868544"/>
         <c:crosses val="autoZero"/>
         <c:auto val="1"/>
         <c:lblAlgn val="ctr"/>
@@ -387,7 +387,7 @@
         <c:noMultiLvlLbl val="0"/>
       </c:catAx>
       <c:valAx>
-        <c:axId val="112104192"/>
+        <c:axId val="109868544"/>
         <c:scaling>
           <c:orientation val="minMax"/>
           <c:max val="5"/>
@@ -400,7 +400,7 @@
         <c:majorTickMark val="out"/>
         <c:minorTickMark val="none"/>
         <c:tickLblPos val="nextTo"/>
-        <c:crossAx val="112102400"/>
+        <c:crossAx val="109867008"/>
         <c:crosses val="autoZero"/>
         <c:crossBetween val="between"/>
         <c:majorUnit val="0.5"/>
@@ -623,7 +623,7 @@
               <a:pPr>
                 <a:defRPr/>
               </a:pPr>
-              <a:t>18/02/2019</a:t>
+              <a:t>25/03/2016</a:t>
             </a:fld>
             <a:endParaRPr lang="fr-FR"/>
           </a:p>
@@ -815,7 +815,7 @@
               <a:pPr>
                 <a:defRPr/>
               </a:pPr>
-              <a:t>18/02/2019</a:t>
+              <a:t>25/03/2016</a:t>
             </a:fld>
             <a:endParaRPr lang="fr-FR"/>
           </a:p>
@@ -1017,7 +1017,7 @@
               <a:pPr>
                 <a:defRPr/>
               </a:pPr>
-              <a:t>18/02/2019</a:t>
+              <a:t>25/03/2016</a:t>
             </a:fld>
             <a:endParaRPr lang="fr-FR"/>
           </a:p>
@@ -1209,7 +1209,7 @@
               <a:pPr>
                 <a:defRPr/>
               </a:pPr>
-              <a:t>18/02/2019</a:t>
+              <a:t>25/03/2016</a:t>
             </a:fld>
             <a:endParaRPr lang="fr-FR"/>
           </a:p>
@@ -1477,7 +1477,7 @@
               <a:pPr>
                 <a:defRPr/>
               </a:pPr>
-              <a:t>18/02/2019</a:t>
+              <a:t>25/03/2016</a:t>
             </a:fld>
             <a:endParaRPr lang="fr-FR"/>
           </a:p>
@@ -1787,7 +1787,7 @@
               <a:pPr>
                 <a:defRPr/>
               </a:pPr>
-              <a:t>18/02/2019</a:t>
+              <a:t>25/03/2016</a:t>
             </a:fld>
             <a:endParaRPr lang="fr-FR"/>
           </a:p>
@@ -2231,7 +2231,7 @@
               <a:pPr>
                 <a:defRPr/>
               </a:pPr>
-              <a:t>18/02/2019</a:t>
+              <a:t>25/03/2016</a:t>
             </a:fld>
             <a:endParaRPr lang="fr-FR"/>
           </a:p>
@@ -2371,7 +2371,7 @@
               <a:pPr>
                 <a:defRPr/>
               </a:pPr>
-              <a:t>18/02/2019</a:t>
+              <a:t>25/03/2016</a:t>
             </a:fld>
             <a:endParaRPr lang="fr-FR"/>
           </a:p>
@@ -2488,7 +2488,7 @@
               <a:pPr>
                 <a:defRPr/>
               </a:pPr>
-              <a:t>18/02/2019</a:t>
+              <a:t>25/03/2016</a:t>
             </a:fld>
             <a:endParaRPr lang="fr-FR"/>
           </a:p>
@@ -2787,7 +2787,7 @@
               <a:pPr>
                 <a:defRPr/>
               </a:pPr>
-              <a:t>18/02/2019</a:t>
+              <a:t>25/03/2016</a:t>
             </a:fld>
             <a:endParaRPr lang="fr-FR"/>
           </a:p>
@@ -3065,7 +3065,7 @@
               <a:pPr>
                 <a:defRPr/>
               </a:pPr>
-              <a:t>18/02/2019</a:t>
+              <a:t>25/03/2016</a:t>
             </a:fld>
             <a:endParaRPr lang="fr-FR"/>
           </a:p>
@@ -3321,7 +3321,7 @@
               <a:pPr>
                 <a:defRPr/>
               </a:pPr>
-              <a:t>18/02/2019</a:t>
+              <a:t>25/03/2016</a:t>
             </a:fld>
             <a:endParaRPr lang="fr-FR"/>
           </a:p>
@@ -3890,7 +3890,11 @@
             </a:br>
             <a:r>
               <a:rPr lang="fr-FR" sz="2000" noProof="1" smtClean="0"/>
-              <a:t>The current document has been generated </a:t>
+              <a:t>The current document has been </a:t>
+            </a:r>
+            <a:r>
+              <a:rPr lang="fr-FR" sz="2000" noProof="1" smtClean="0"/>
+              <a:t>generated </a:t>
             </a:r>
             <a:r>
               <a:rPr lang="fr-FR" sz="2000" noProof="1"/>
@@ -4420,7 +4424,7 @@
           <p:nvPr>
             <p:extLst>
               <p:ext uri="{D42A27DB-BD31-4B8C-83A1-F6EECF244321}">
-                <p14:modId xmlns:p14="http://schemas.microsoft.com/office/powerpoint/2010/main" val="2512863157"/>
+                <p14:modId xmlns:p14="http://schemas.microsoft.com/office/powerpoint/2010/main" val="2463261424"/>
               </p:ext>
             </p:extLst>
           </p:nvPr>
@@ -4480,27 +4484,7 @@
                   </a:schemeClr>
                 </a:solidFill>
               </a:rPr>
-              <a:t>It’s quite easy to merge a chart in a PowerPoint Presentation. You can see that in the template, </a:t>
-            </a:r>
-            <a:r>
-              <a:rPr lang="en-US" sz="1000" dirty="0" smtClean="0">
-                <a:solidFill>
-                  <a:schemeClr val="bg2">
-                    <a:lumMod val="50000"/>
-                  </a:schemeClr>
-                </a:solidFill>
-              </a:rPr>
-              <a:t>all bars have equal values. </a:t>
-            </a:r>
-            <a:r>
-              <a:rPr lang="en-US" sz="1000" dirty="0" smtClean="0">
-                <a:solidFill>
-                  <a:schemeClr val="bg2">
-                    <a:lumMod val="50000"/>
-                  </a:schemeClr>
-                </a:solidFill>
-              </a:rPr>
-              <a:t>Now watch the merged result.</a:t>
+              <a:t>It’s quite easy to merge a chart in a PowerPoint Presentation. You can see that in the template, no bars can go above value « 2 ». Now watch the merged result.</a:t>
             </a:r>
             <a:endParaRPr lang="en-US" sz="1000" dirty="0">
               <a:solidFill>

</xml_diff>

<commit_message>
FEAT #17423 TIME 2:30 update tinybutstrong + migration + doc
</commit_message>
<xml_diff>
--- a/vendor/tinybutstrong/opentbs/demo/demo_ms_powerpoint.pptx
+++ b/vendor/tinybutstrong/opentbs/demo/demo_ms_powerpoint.pptx
@@ -219,13 +219,13 @@
                   <c:v>1.5</c:v>
                 </c:pt>
                 <c:pt idx="1">
-                  <c:v>1.1000000000000001</c:v>
+                  <c:v>1.5</c:v>
                 </c:pt>
                 <c:pt idx="2">
-                  <c:v>0.5</c:v>
+                  <c:v>1.5</c:v>
                 </c:pt>
                 <c:pt idx="3">
-                  <c:v>0.2</c:v>
+                  <c:v>1.5</c:v>
                 </c:pt>
               </c:numCache>
             </c:numRef>
@@ -273,13 +273,13 @@
                 <c:formatCode>General</c:formatCode>
                 <c:ptCount val="4"/>
                 <c:pt idx="0">
-                  <c:v>0.3</c:v>
+                  <c:v>1.5</c:v>
                 </c:pt>
                 <c:pt idx="1">
-                  <c:v>0.7</c:v>
+                  <c:v>1.5</c:v>
                 </c:pt>
                 <c:pt idx="2">
-                  <c:v>1.2</c:v>
+                  <c:v>1.5</c:v>
                 </c:pt>
                 <c:pt idx="3">
                   <c:v>1.5</c:v>
@@ -333,13 +333,13 @@
                   <c:v>1.5</c:v>
                 </c:pt>
                 <c:pt idx="1">
-                  <c:v>1.7</c:v>
+                  <c:v>1.5</c:v>
                 </c:pt>
                 <c:pt idx="2">
-                  <c:v>1.6</c:v>
+                  <c:v>1.5</c:v>
                 </c:pt>
                 <c:pt idx="3">
-                  <c:v>1.3</c:v>
+                  <c:v>1.5</c:v>
                 </c:pt>
               </c:numCache>
             </c:numRef>
@@ -355,12 +355,12 @@
         </c:dLbls>
         <c:gapWidth val="150"/>
         <c:shape val="cylinder"/>
-        <c:axId val="109867008"/>
-        <c:axId val="109868544"/>
+        <c:axId val="112102400"/>
+        <c:axId val="112104192"/>
         <c:axId val="0"/>
       </c:bar3DChart>
       <c:catAx>
-        <c:axId val="109867008"/>
+        <c:axId val="112102400"/>
         <c:scaling>
           <c:orientation val="minMax"/>
         </c:scaling>
@@ -379,7 +379,7 @@
             <a:endParaRPr lang="fr-FR"/>
           </a:p>
         </c:txPr>
-        <c:crossAx val="109868544"/>
+        <c:crossAx val="112104192"/>
         <c:crosses val="autoZero"/>
         <c:auto val="1"/>
         <c:lblAlgn val="ctr"/>
@@ -387,7 +387,7 @@
         <c:noMultiLvlLbl val="0"/>
       </c:catAx>
       <c:valAx>
-        <c:axId val="109868544"/>
+        <c:axId val="112104192"/>
         <c:scaling>
           <c:orientation val="minMax"/>
           <c:max val="5"/>
@@ -400,7 +400,7 @@
         <c:majorTickMark val="out"/>
         <c:minorTickMark val="none"/>
         <c:tickLblPos val="nextTo"/>
-        <c:crossAx val="109867008"/>
+        <c:crossAx val="112102400"/>
         <c:crosses val="autoZero"/>
         <c:crossBetween val="between"/>
         <c:majorUnit val="0.5"/>
@@ -623,7 +623,7 @@
               <a:pPr>
                 <a:defRPr/>
               </a:pPr>
-              <a:t>25/03/2016</a:t>
+              <a:t>18/02/2019</a:t>
             </a:fld>
             <a:endParaRPr lang="fr-FR"/>
           </a:p>
@@ -815,7 +815,7 @@
               <a:pPr>
                 <a:defRPr/>
               </a:pPr>
-              <a:t>25/03/2016</a:t>
+              <a:t>18/02/2019</a:t>
             </a:fld>
             <a:endParaRPr lang="fr-FR"/>
           </a:p>
@@ -1017,7 +1017,7 @@
               <a:pPr>
                 <a:defRPr/>
               </a:pPr>
-              <a:t>25/03/2016</a:t>
+              <a:t>18/02/2019</a:t>
             </a:fld>
             <a:endParaRPr lang="fr-FR"/>
           </a:p>
@@ -1209,7 +1209,7 @@
               <a:pPr>
                 <a:defRPr/>
               </a:pPr>
-              <a:t>25/03/2016</a:t>
+              <a:t>18/02/2019</a:t>
             </a:fld>
             <a:endParaRPr lang="fr-FR"/>
           </a:p>
@@ -1477,7 +1477,7 @@
               <a:pPr>
                 <a:defRPr/>
               </a:pPr>
-              <a:t>25/03/2016</a:t>
+              <a:t>18/02/2019</a:t>
             </a:fld>
             <a:endParaRPr lang="fr-FR"/>
           </a:p>
@@ -1787,7 +1787,7 @@
               <a:pPr>
                 <a:defRPr/>
               </a:pPr>
-              <a:t>25/03/2016</a:t>
+              <a:t>18/02/2019</a:t>
             </a:fld>
             <a:endParaRPr lang="fr-FR"/>
           </a:p>
@@ -2231,7 +2231,7 @@
               <a:pPr>
                 <a:defRPr/>
               </a:pPr>
-              <a:t>25/03/2016</a:t>
+              <a:t>18/02/2019</a:t>
             </a:fld>
             <a:endParaRPr lang="fr-FR"/>
           </a:p>
@@ -2371,7 +2371,7 @@
               <a:pPr>
                 <a:defRPr/>
               </a:pPr>
-              <a:t>25/03/2016</a:t>
+              <a:t>18/02/2019</a:t>
             </a:fld>
             <a:endParaRPr lang="fr-FR"/>
           </a:p>
@@ -2488,7 +2488,7 @@
               <a:pPr>
                 <a:defRPr/>
               </a:pPr>
-              <a:t>25/03/2016</a:t>
+              <a:t>18/02/2019</a:t>
             </a:fld>
             <a:endParaRPr lang="fr-FR"/>
           </a:p>
@@ -2787,7 +2787,7 @@
               <a:pPr>
                 <a:defRPr/>
               </a:pPr>
-              <a:t>25/03/2016</a:t>
+              <a:t>18/02/2019</a:t>
             </a:fld>
             <a:endParaRPr lang="fr-FR"/>
           </a:p>
@@ -3065,7 +3065,7 @@
               <a:pPr>
                 <a:defRPr/>
               </a:pPr>
-              <a:t>25/03/2016</a:t>
+              <a:t>18/02/2019</a:t>
             </a:fld>
             <a:endParaRPr lang="fr-FR"/>
           </a:p>
@@ -3321,7 +3321,7 @@
               <a:pPr>
                 <a:defRPr/>
               </a:pPr>
-              <a:t>25/03/2016</a:t>
+              <a:t>18/02/2019</a:t>
             </a:fld>
             <a:endParaRPr lang="fr-FR"/>
           </a:p>
@@ -3890,11 +3890,7 @@
             </a:br>
             <a:r>
               <a:rPr lang="fr-FR" sz="2000" noProof="1" smtClean="0"/>
-              <a:t>The current document has been </a:t>
-            </a:r>
-            <a:r>
-              <a:rPr lang="fr-FR" sz="2000" noProof="1" smtClean="0"/>
-              <a:t>generated </a:t>
+              <a:t>The current document has been generated </a:t>
             </a:r>
             <a:r>
               <a:rPr lang="fr-FR" sz="2000" noProof="1"/>
@@ -4424,7 +4420,7 @@
           <p:nvPr>
             <p:extLst>
               <p:ext uri="{D42A27DB-BD31-4B8C-83A1-F6EECF244321}">
-                <p14:modId xmlns:p14="http://schemas.microsoft.com/office/powerpoint/2010/main" val="2463261424"/>
+                <p14:modId xmlns:p14="http://schemas.microsoft.com/office/powerpoint/2010/main" val="2512863157"/>
               </p:ext>
             </p:extLst>
           </p:nvPr>
@@ -4484,7 +4480,27 @@
                   </a:schemeClr>
                 </a:solidFill>
               </a:rPr>
-              <a:t>It’s quite easy to merge a chart in a PowerPoint Presentation. You can see that in the template, no bars can go above value « 2 ». Now watch the merged result.</a:t>
+              <a:t>It’s quite easy to merge a chart in a PowerPoint Presentation. You can see that in the template, </a:t>
+            </a:r>
+            <a:r>
+              <a:rPr lang="en-US" sz="1000" dirty="0" smtClean="0">
+                <a:solidFill>
+                  <a:schemeClr val="bg2">
+                    <a:lumMod val="50000"/>
+                  </a:schemeClr>
+                </a:solidFill>
+              </a:rPr>
+              <a:t>all bars have equal values. </a:t>
+            </a:r>
+            <a:r>
+              <a:rPr lang="en-US" sz="1000" dirty="0" smtClean="0">
+                <a:solidFill>
+                  <a:schemeClr val="bg2">
+                    <a:lumMod val="50000"/>
+                  </a:schemeClr>
+                </a:solidFill>
+              </a:rPr>
+              <a:t>Now watch the merged result.</a:t>
             </a:r>
             <a:endParaRPr lang="en-US" sz="1000" dirty="0">
               <a:solidFill>

</xml_diff>